<commit_message>
Vejledermøde dagorden 20160504 minor change in review powerpoint
</commit_message>
<xml_diff>
--- a/Review/GoofyCandygun3000.pptx
+++ b/Review/GoofyCandygun3000.pptx
@@ -115,6 +115,11 @@
       </a:defRPr>
     </a:lvl9pPr>
   </p:defaultTextStyle>
+  <p:extLst>
+    <p:ext uri="{EFAFB233-063F-42B5-8137-9DF3F51BA10A}">
+      <p15:sldGuideLst xmlns:p15="http://schemas.microsoft.com/office/powerpoint/2012/main"/>
+    </p:ext>
+  </p:extLst>
 </p:presentation>
 </file>
 
@@ -314,7 +319,7 @@
           <a:p>
             <a:fld id="{DFA55FBF-B3DD-42BB-9C5C-5E4BF1C57523}" type="datetimeFigureOut">
               <a:rPr lang="da-DK" smtClean="0"/>
-              <a:t>02-05-2016</a:t>
+              <a:t>03-05-2016</a:t>
             </a:fld>
             <a:endParaRPr lang="da-DK"/>
           </a:p>
@@ -356,7 +361,7 @@
           <a:p>
             <a:fld id="{ABCE997B-43D6-490A-AA11-5F2C5654DC87}" type="slidenum">
               <a:rPr lang="da-DK" smtClean="0"/>
-              <a:t>‹#›</a:t>
+              <a:t>‹nr.›</a:t>
             </a:fld>
             <a:endParaRPr lang="da-DK"/>
           </a:p>
@@ -600,7 +605,7 @@
           <a:p>
             <a:fld id="{DFA55FBF-B3DD-42BB-9C5C-5E4BF1C57523}" type="datetimeFigureOut">
               <a:rPr lang="da-DK" smtClean="0"/>
-              <a:t>02-05-2016</a:t>
+              <a:t>03-05-2016</a:t>
             </a:fld>
             <a:endParaRPr lang="da-DK"/>
           </a:p>
@@ -642,7 +647,7 @@
           <a:p>
             <a:fld id="{ABCE997B-43D6-490A-AA11-5F2C5654DC87}" type="slidenum">
               <a:rPr lang="da-DK" smtClean="0"/>
-              <a:t>‹#›</a:t>
+              <a:t>‹nr.›</a:t>
             </a:fld>
             <a:endParaRPr lang="da-DK"/>
           </a:p>
@@ -792,7 +797,7 @@
           <a:p>
             <a:fld id="{DFA55FBF-B3DD-42BB-9C5C-5E4BF1C57523}" type="datetimeFigureOut">
               <a:rPr lang="da-DK" smtClean="0"/>
-              <a:t>02-05-2016</a:t>
+              <a:t>03-05-2016</a:t>
             </a:fld>
             <a:endParaRPr lang="da-DK"/>
           </a:p>
@@ -834,7 +839,7 @@
           <a:p>
             <a:fld id="{ABCE997B-43D6-490A-AA11-5F2C5654DC87}" type="slidenum">
               <a:rPr lang="da-DK" smtClean="0"/>
-              <a:t>‹#›</a:t>
+              <a:t>‹nr.›</a:t>
             </a:fld>
             <a:endParaRPr lang="da-DK"/>
           </a:p>
@@ -1053,7 +1058,7 @@
           <a:p>
             <a:fld id="{DFA55FBF-B3DD-42BB-9C5C-5E4BF1C57523}" type="datetimeFigureOut">
               <a:rPr lang="da-DK" smtClean="0"/>
-              <a:t>02-05-2016</a:t>
+              <a:t>03-05-2016</a:t>
             </a:fld>
             <a:endParaRPr lang="da-DK"/>
           </a:p>
@@ -1095,7 +1100,7 @@
           <a:p>
             <a:fld id="{ABCE997B-43D6-490A-AA11-5F2C5654DC87}" type="slidenum">
               <a:rPr lang="da-DK" smtClean="0"/>
-              <a:t>‹#›</a:t>
+              <a:t>‹nr.›</a:t>
             </a:fld>
             <a:endParaRPr lang="da-DK"/>
           </a:p>
@@ -1479,7 +1484,7 @@
           <a:p>
             <a:fld id="{DFA55FBF-B3DD-42BB-9C5C-5E4BF1C57523}" type="datetimeFigureOut">
               <a:rPr lang="da-DK" smtClean="0"/>
-              <a:t>02-05-2016</a:t>
+              <a:t>03-05-2016</a:t>
             </a:fld>
             <a:endParaRPr lang="da-DK"/>
           </a:p>
@@ -1521,7 +1526,7 @@
           <a:p>
             <a:fld id="{ABCE997B-43D6-490A-AA11-5F2C5654DC87}" type="slidenum">
               <a:rPr lang="da-DK" smtClean="0"/>
-              <a:t>‹#›</a:t>
+              <a:t>‹nr.›</a:t>
             </a:fld>
             <a:endParaRPr lang="da-DK"/>
           </a:p>
@@ -2025,7 +2030,7 @@
           <a:p>
             <a:fld id="{DFA55FBF-B3DD-42BB-9C5C-5E4BF1C57523}" type="datetimeFigureOut">
               <a:rPr lang="da-DK" smtClean="0"/>
-              <a:t>02-05-2016</a:t>
+              <a:t>03-05-2016</a:t>
             </a:fld>
             <a:endParaRPr lang="da-DK"/>
           </a:p>
@@ -2067,7 +2072,7 @@
           <a:p>
             <a:fld id="{ABCE997B-43D6-490A-AA11-5F2C5654DC87}" type="slidenum">
               <a:rPr lang="da-DK" smtClean="0"/>
-              <a:t>‹#›</a:t>
+              <a:t>‹nr.›</a:t>
             </a:fld>
             <a:endParaRPr lang="da-DK"/>
           </a:p>
@@ -2856,7 +2861,7 @@
           <a:p>
             <a:fld id="{DFA55FBF-B3DD-42BB-9C5C-5E4BF1C57523}" type="datetimeFigureOut">
               <a:rPr lang="da-DK" smtClean="0"/>
-              <a:t>02-05-2016</a:t>
+              <a:t>03-05-2016</a:t>
             </a:fld>
             <a:endParaRPr lang="da-DK"/>
           </a:p>
@@ -2898,7 +2903,7 @@
           <a:p>
             <a:fld id="{ABCE997B-43D6-490A-AA11-5F2C5654DC87}" type="slidenum">
               <a:rPr lang="da-DK" smtClean="0"/>
-              <a:t>‹#›</a:t>
+              <a:t>‹nr.›</a:t>
             </a:fld>
             <a:endParaRPr lang="da-DK"/>
           </a:p>
@@ -3026,7 +3031,7 @@
           <a:p>
             <a:fld id="{DFA55FBF-B3DD-42BB-9C5C-5E4BF1C57523}" type="datetimeFigureOut">
               <a:rPr lang="da-DK" smtClean="0"/>
-              <a:t>02-05-2016</a:t>
+              <a:t>03-05-2016</a:t>
             </a:fld>
             <a:endParaRPr lang="da-DK"/>
           </a:p>
@@ -3068,7 +3073,7 @@
           <a:p>
             <a:fld id="{ABCE997B-43D6-490A-AA11-5F2C5654DC87}" type="slidenum">
               <a:rPr lang="da-DK" smtClean="0"/>
-              <a:t>‹#›</a:t>
+              <a:t>‹nr.›</a:t>
             </a:fld>
             <a:endParaRPr lang="da-DK"/>
           </a:p>
@@ -3206,7 +3211,7 @@
           <a:p>
             <a:fld id="{DFA55FBF-B3DD-42BB-9C5C-5E4BF1C57523}" type="datetimeFigureOut">
               <a:rPr lang="da-DK" smtClean="0"/>
-              <a:t>02-05-2016</a:t>
+              <a:t>03-05-2016</a:t>
             </a:fld>
             <a:endParaRPr lang="da-DK"/>
           </a:p>
@@ -3248,7 +3253,7 @@
           <a:p>
             <a:fld id="{ABCE997B-43D6-490A-AA11-5F2C5654DC87}" type="slidenum">
               <a:rPr lang="da-DK" smtClean="0"/>
-              <a:t>‹#›</a:t>
+              <a:t>‹nr.›</a:t>
             </a:fld>
             <a:endParaRPr lang="da-DK"/>
           </a:p>
@@ -3381,7 +3386,7 @@
           <a:p>
             <a:fld id="{DFA55FBF-B3DD-42BB-9C5C-5E4BF1C57523}" type="datetimeFigureOut">
               <a:rPr lang="da-DK" smtClean="0"/>
-              <a:t>02-05-2016</a:t>
+              <a:t>03-05-2016</a:t>
             </a:fld>
             <a:endParaRPr lang="da-DK"/>
           </a:p>
@@ -3423,7 +3428,7 @@
           <a:p>
             <a:fld id="{ABCE997B-43D6-490A-AA11-5F2C5654DC87}" type="slidenum">
               <a:rPr lang="da-DK" smtClean="0"/>
-              <a:t>‹#›</a:t>
+              <a:t>‹nr.›</a:t>
             </a:fld>
             <a:endParaRPr lang="da-DK"/>
           </a:p>
@@ -3638,7 +3643,7 @@
           <a:p>
             <a:fld id="{DFA55FBF-B3DD-42BB-9C5C-5E4BF1C57523}" type="datetimeFigureOut">
               <a:rPr lang="da-DK" smtClean="0"/>
-              <a:t>02-05-2016</a:t>
+              <a:t>03-05-2016</a:t>
             </a:fld>
             <a:endParaRPr lang="da-DK"/>
           </a:p>
@@ -3680,7 +3685,7 @@
           <a:p>
             <a:fld id="{ABCE997B-43D6-490A-AA11-5F2C5654DC87}" type="slidenum">
               <a:rPr lang="da-DK" smtClean="0"/>
-              <a:t>‹#›</a:t>
+              <a:t>‹nr.›</a:t>
             </a:fld>
             <a:endParaRPr lang="da-DK"/>
           </a:p>
@@ -3875,7 +3880,7 @@
           <a:p>
             <a:fld id="{DFA55FBF-B3DD-42BB-9C5C-5E4BF1C57523}" type="datetimeFigureOut">
               <a:rPr lang="da-DK" smtClean="0"/>
-              <a:t>02-05-2016</a:t>
+              <a:t>03-05-2016</a:t>
             </a:fld>
             <a:endParaRPr lang="da-DK"/>
           </a:p>
@@ -3917,7 +3922,7 @@
           <a:p>
             <a:fld id="{ABCE997B-43D6-490A-AA11-5F2C5654DC87}" type="slidenum">
               <a:rPr lang="da-DK" smtClean="0"/>
-              <a:t>‹#›</a:t>
+              <a:t>‹nr.›</a:t>
             </a:fld>
             <a:endParaRPr lang="da-DK"/>
           </a:p>
@@ -4268,7 +4273,7 @@
           <a:p>
             <a:fld id="{DFA55FBF-B3DD-42BB-9C5C-5E4BF1C57523}" type="datetimeFigureOut">
               <a:rPr lang="da-DK" smtClean="0"/>
-              <a:t>02-05-2016</a:t>
+              <a:t>03-05-2016</a:t>
             </a:fld>
             <a:endParaRPr lang="da-DK"/>
           </a:p>
@@ -4310,7 +4315,7 @@
           <a:p>
             <a:fld id="{ABCE997B-43D6-490A-AA11-5F2C5654DC87}" type="slidenum">
               <a:rPr lang="da-DK" smtClean="0"/>
-              <a:t>‹#›</a:t>
+              <a:t>‹nr.›</a:t>
             </a:fld>
             <a:endParaRPr lang="da-DK"/>
           </a:p>
@@ -4386,7 +4391,7 @@
           <a:p>
             <a:fld id="{DFA55FBF-B3DD-42BB-9C5C-5E4BF1C57523}" type="datetimeFigureOut">
               <a:rPr lang="da-DK" smtClean="0"/>
-              <a:t>02-05-2016</a:t>
+              <a:t>03-05-2016</a:t>
             </a:fld>
             <a:endParaRPr lang="da-DK"/>
           </a:p>
@@ -4428,7 +4433,7 @@
           <a:p>
             <a:fld id="{ABCE997B-43D6-490A-AA11-5F2C5654DC87}" type="slidenum">
               <a:rPr lang="da-DK" smtClean="0"/>
-              <a:t>‹#›</a:t>
+              <a:t>‹nr.›</a:t>
             </a:fld>
             <a:endParaRPr lang="da-DK"/>
           </a:p>
@@ -4481,7 +4486,7 @@
           <a:p>
             <a:fld id="{DFA55FBF-B3DD-42BB-9C5C-5E4BF1C57523}" type="datetimeFigureOut">
               <a:rPr lang="da-DK" smtClean="0"/>
-              <a:t>02-05-2016</a:t>
+              <a:t>03-05-2016</a:t>
             </a:fld>
             <a:endParaRPr lang="da-DK"/>
           </a:p>
@@ -4523,7 +4528,7 @@
           <a:p>
             <a:fld id="{ABCE997B-43D6-490A-AA11-5F2C5654DC87}" type="slidenum">
               <a:rPr lang="da-DK" smtClean="0"/>
-              <a:t>‹#›</a:t>
+              <a:t>‹nr.›</a:t>
             </a:fld>
             <a:endParaRPr lang="da-DK"/>
           </a:p>
@@ -4754,7 +4759,7 @@
           <a:p>
             <a:fld id="{DFA55FBF-B3DD-42BB-9C5C-5E4BF1C57523}" type="datetimeFigureOut">
               <a:rPr lang="da-DK" smtClean="0"/>
-              <a:t>02-05-2016</a:t>
+              <a:t>03-05-2016</a:t>
             </a:fld>
             <a:endParaRPr lang="da-DK"/>
           </a:p>
@@ -4796,7 +4801,7 @@
           <a:p>
             <a:fld id="{ABCE997B-43D6-490A-AA11-5F2C5654DC87}" type="slidenum">
               <a:rPr lang="da-DK" smtClean="0"/>
-              <a:t>‹#›</a:t>
+              <a:t>‹nr.›</a:t>
             </a:fld>
             <a:endParaRPr lang="da-DK"/>
           </a:p>
@@ -5035,7 +5040,7 @@
           <a:p>
             <a:fld id="{DFA55FBF-B3DD-42BB-9C5C-5E4BF1C57523}" type="datetimeFigureOut">
               <a:rPr lang="da-DK" smtClean="0"/>
-              <a:t>02-05-2016</a:t>
+              <a:t>03-05-2016</a:t>
             </a:fld>
             <a:endParaRPr lang="da-DK"/>
           </a:p>
@@ -5077,7 +5082,7 @@
           <a:p>
             <a:fld id="{ABCE997B-43D6-490A-AA11-5F2C5654DC87}" type="slidenum">
               <a:rPr lang="da-DK" smtClean="0"/>
-              <a:t>‹#›</a:t>
+              <a:t>‹nr.›</a:t>
             </a:fld>
             <a:endParaRPr lang="da-DK"/>
           </a:p>
@@ -5275,7 +5280,7 @@
           <a:p>
             <a:fld id="{DFA55FBF-B3DD-42BB-9C5C-5E4BF1C57523}" type="datetimeFigureOut">
               <a:rPr lang="da-DK" smtClean="0"/>
-              <a:t>02-05-2016</a:t>
+              <a:t>03-05-2016</a:t>
             </a:fld>
             <a:endParaRPr lang="da-DK"/>
           </a:p>
@@ -5389,7 +5394,7 @@
           <a:p>
             <a:fld id="{ABCE997B-43D6-490A-AA11-5F2C5654DC87}" type="slidenum">
               <a:rPr lang="da-DK" smtClean="0"/>
-              <a:t>‹#›</a:t>
+              <a:t>‹nr.›</a:t>
             </a:fld>
             <a:endParaRPr lang="da-DK"/>
           </a:p>
@@ -5975,22 +5980,54 @@
           <a:bodyPr/>
           <a:lstStyle/>
           <a:p>
-            <a:r>
-              <a:rPr lang="en-US" dirty="0" err="1" smtClean="0"/>
-              <a:t>Noget</a:t>
-            </a:r>
-            <a:r>
-              <a:rPr lang="en-US" dirty="0" smtClean="0"/>
-              <a:t> med </a:t>
-            </a:r>
-            <a:r>
-              <a:rPr lang="en-US" dirty="0" err="1" smtClean="0"/>
-              <a:t>lego</a:t>
-            </a:r>
+            <a:pPr marL="0" indent="0">
+              <a:buNone/>
+            </a:pPr>
             <a:endParaRPr lang="da-DK" dirty="0"/>
           </a:p>
         </p:txBody>
       </p:sp>
+      <p:pic>
+        <p:nvPicPr>
+          <p:cNvPr id="1026" name="Picture 2" descr="http://cdn.instructables.com/FJB/W9X6/G23UXE4S/FJBW9X6G23UXE4S.MEDIUM.jpg"/>
+          <p:cNvPicPr>
+            <a:picLocks noChangeAspect="1" noChangeArrowheads="1"/>
+          </p:cNvPicPr>
+          <p:nvPr/>
+        </p:nvPicPr>
+        <p:blipFill>
+          <a:blip r:embed="rId2">
+            <a:extLst>
+              <a:ext uri="{28A0092B-C50C-407E-A947-70E740481C1C}">
+                <a14:useLocalDpi xmlns:a14="http://schemas.microsoft.com/office/drawing/2010/main" val="0"/>
+              </a:ext>
+            </a:extLst>
+          </a:blip>
+          <a:srcRect/>
+          <a:stretch>
+            <a:fillRect/>
+          </a:stretch>
+        </p:blipFill>
+        <p:spPr bwMode="auto">
+          <a:xfrm>
+            <a:off x="2808623" y="1802394"/>
+            <a:ext cx="5905500" cy="4429126"/>
+          </a:xfrm>
+          <a:prstGeom prst="rect">
+            <a:avLst/>
+          </a:prstGeom>
+          <a:noFill/>
+          <a:extLst>
+            <a:ext uri="{909E8E84-426E-40DD-AFC4-6F175D3DCCD1}">
+              <a14:hiddenFill xmlns:a14="http://schemas.microsoft.com/office/drawing/2010/main">
+                <a:solidFill>
+                  <a:srgbClr val="FFFFFF"/>
+                </a:solidFill>
+              </a14:hiddenFill>
+            </a:ext>
+          </a:extLst>
+        </p:spPr>
+      </p:pic>
     </p:spTree>
     <p:extLst>
       <p:ext uri="{BB962C8B-B14F-4D97-AF65-F5344CB8AC3E}">

</xml_diff>